<commit_message>
Updated typo in slide
Updated typo in slide
</commit_message>
<xml_diff>
--- a/DSC530_Final_Project_Tertiary_Government_Spending_Analysis_Alan_Danque.pptx
+++ b/DSC530_Final_Project_Tertiary_Government_Spending_Analysis_Alan_Danque.pptx
@@ -251,7 +251,7 @@
           <a:p>
             <a:fld id="{76051A14-CBD7-7A49-853D-4C5E532F94AB}" type="datetimeFigureOut">
               <a:rPr lang="en-US" smtClean="0"/>
-              <a:t>10/26/19</a:t>
+              <a:t>11/5/19</a:t>
             </a:fld>
             <a:endParaRPr lang="en-US"/>
           </a:p>
@@ -749,7 +749,7 @@
           <a:p>
             <a:fld id="{9975B3AD-33F2-CB4B-8F9F-CDF79863E388}" type="datetimeFigureOut">
               <a:rPr lang="en-US" smtClean="0"/>
-              <a:t>10/26/19</a:t>
+              <a:t>11/5/19</a:t>
             </a:fld>
             <a:endParaRPr lang="en-US"/>
           </a:p>
@@ -947,7 +947,7 @@
           <a:p>
             <a:fld id="{9975B3AD-33F2-CB4B-8F9F-CDF79863E388}" type="datetimeFigureOut">
               <a:rPr lang="en-US" smtClean="0"/>
-              <a:t>10/26/19</a:t>
+              <a:t>11/5/19</a:t>
             </a:fld>
             <a:endParaRPr lang="en-US"/>
           </a:p>
@@ -1155,7 +1155,7 @@
           <a:p>
             <a:fld id="{9975B3AD-33F2-CB4B-8F9F-CDF79863E388}" type="datetimeFigureOut">
               <a:rPr lang="en-US" smtClean="0"/>
-              <a:t>10/26/19</a:t>
+              <a:t>11/5/19</a:t>
             </a:fld>
             <a:endParaRPr lang="en-US"/>
           </a:p>
@@ -1353,7 +1353,7 @@
           <a:p>
             <a:fld id="{9975B3AD-33F2-CB4B-8F9F-CDF79863E388}" type="datetimeFigureOut">
               <a:rPr lang="en-US" smtClean="0"/>
-              <a:t>10/26/19</a:t>
+              <a:t>11/5/19</a:t>
             </a:fld>
             <a:endParaRPr lang="en-US"/>
           </a:p>
@@ -1628,7 +1628,7 @@
           <a:p>
             <a:fld id="{9975B3AD-33F2-CB4B-8F9F-CDF79863E388}" type="datetimeFigureOut">
               <a:rPr lang="en-US" smtClean="0"/>
-              <a:t>10/26/19</a:t>
+              <a:t>11/5/19</a:t>
             </a:fld>
             <a:endParaRPr lang="en-US"/>
           </a:p>
@@ -1893,7 +1893,7 @@
           <a:p>
             <a:fld id="{9975B3AD-33F2-CB4B-8F9F-CDF79863E388}" type="datetimeFigureOut">
               <a:rPr lang="en-US" smtClean="0"/>
-              <a:t>10/26/19</a:t>
+              <a:t>11/5/19</a:t>
             </a:fld>
             <a:endParaRPr lang="en-US"/>
           </a:p>
@@ -2305,7 +2305,7 @@
           <a:p>
             <a:fld id="{9975B3AD-33F2-CB4B-8F9F-CDF79863E388}" type="datetimeFigureOut">
               <a:rPr lang="en-US" smtClean="0"/>
-              <a:t>10/26/19</a:t>
+              <a:t>11/5/19</a:t>
             </a:fld>
             <a:endParaRPr lang="en-US"/>
           </a:p>
@@ -2446,7 +2446,7 @@
           <a:p>
             <a:fld id="{9975B3AD-33F2-CB4B-8F9F-CDF79863E388}" type="datetimeFigureOut">
               <a:rPr lang="en-US" smtClean="0"/>
-              <a:t>10/26/19</a:t>
+              <a:t>11/5/19</a:t>
             </a:fld>
             <a:endParaRPr lang="en-US"/>
           </a:p>
@@ -2559,7 +2559,7 @@
           <a:p>
             <a:fld id="{9975B3AD-33F2-CB4B-8F9F-CDF79863E388}" type="datetimeFigureOut">
               <a:rPr lang="en-US" smtClean="0"/>
-              <a:t>10/26/19</a:t>
+              <a:t>11/5/19</a:t>
             </a:fld>
             <a:endParaRPr lang="en-US"/>
           </a:p>
@@ -2870,7 +2870,7 @@
           <a:p>
             <a:fld id="{9975B3AD-33F2-CB4B-8F9F-CDF79863E388}" type="datetimeFigureOut">
               <a:rPr lang="en-US" smtClean="0"/>
-              <a:t>10/26/19</a:t>
+              <a:t>11/5/19</a:t>
             </a:fld>
             <a:endParaRPr lang="en-US"/>
           </a:p>
@@ -3158,7 +3158,7 @@
           <a:p>
             <a:fld id="{9975B3AD-33F2-CB4B-8F9F-CDF79863E388}" type="datetimeFigureOut">
               <a:rPr lang="en-US" smtClean="0"/>
-              <a:t>10/26/19</a:t>
+              <a:t>11/5/19</a:t>
             </a:fld>
             <a:endParaRPr lang="en-US"/>
           </a:p>
@@ -3399,7 +3399,7 @@
           <a:p>
             <a:fld id="{9975B3AD-33F2-CB4B-8F9F-CDF79863E388}" type="datetimeFigureOut">
               <a:rPr lang="en-US" smtClean="0"/>
-              <a:t>10/26/19</a:t>
+              <a:t>11/5/19</a:t>
             </a:fld>
             <a:endParaRPr lang="en-US"/>
           </a:p>
@@ -4044,7 +4044,7 @@
           <a:p>
             <a:r>
               <a:rPr lang="en-US" dirty="0"/>
-              <a:t>Mode is / are: 0.0</a:t>
+              <a:t>Mode is / are: 0.0 (all values are unique)</a:t>
             </a:r>
           </a:p>
           <a:p>
@@ -4333,8 +4333,11 @@
           <a:p>
             <a:r>
               <a:rPr lang="en-US" dirty="0"/>
-              <a:t>No mode found</a:t>
-            </a:r>
+              <a:t>No mode found (all values are unique)</a:t>
+            </a:r>
+          </a:p>
+          <a:p>
+            <a:endParaRPr lang="en-US" dirty="0"/>
           </a:p>
         </p:txBody>
       </p:sp>
@@ -4510,8 +4513,11 @@
           <a:p>
             <a:r>
               <a:rPr lang="en-US" dirty="0"/>
-              <a:t>No mode found</a:t>
-            </a:r>
+              <a:t>No mode found (all values are unique)</a:t>
+            </a:r>
+          </a:p>
+          <a:p>
+            <a:endParaRPr lang="en-US" dirty="0"/>
           </a:p>
           <a:p>
             <a:endParaRPr lang="en-US" dirty="0"/>
@@ -4796,8 +4802,11 @@
           <a:p>
             <a:r>
               <a:rPr lang="en-US" dirty="0"/>
-              <a:t>No mode found</a:t>
-            </a:r>
+              <a:t>No mode found (all values are unique)</a:t>
+            </a:r>
+          </a:p>
+          <a:p>
+            <a:endParaRPr lang="en-US" dirty="0"/>
           </a:p>
         </p:txBody>
       </p:sp>
@@ -5140,8 +5149,11 @@
           <a:p>
             <a:r>
               <a:rPr lang="en-US" dirty="0"/>
-              <a:t>No mode found</a:t>
-            </a:r>
+              <a:t>No mode found (all values are unique)</a:t>
+            </a:r>
+          </a:p>
+          <a:p>
+            <a:endParaRPr lang="en-US" dirty="0"/>
           </a:p>
           <a:p>
             <a:endParaRPr lang="en-US" dirty="0"/>
@@ -5426,8 +5438,11 @@
           <a:p>
             <a:r>
               <a:rPr lang="en-US" dirty="0"/>
-              <a:t>Mode is / are: 0.0</a:t>
-            </a:r>
+              <a:t>Mode is / are: 0.0 (all values are unique)</a:t>
+            </a:r>
+          </a:p>
+          <a:p>
+            <a:endParaRPr lang="en-US" dirty="0"/>
           </a:p>
         </p:txBody>
       </p:sp>

</xml_diff>